<commit_message>
merge is working for 10 images
</commit_message>
<xml_diff>
--- a/graphics-design/design/number-labels.pptx
+++ b/graphics-design/design/number-labels.pptx
@@ -249,7 +249,7 @@
           <a:p>
             <a:fld id="{2D9AFD49-2911-40A0-8C34-1C3909DA5CA6}" type="datetimeFigureOut">
               <a:rPr lang="en-US" smtClean="0"/>
-              <a:t>6/5/2020</a:t>
+              <a:t>6/6/2020</a:t>
             </a:fld>
             <a:endParaRPr lang="en-US"/>
           </a:p>
@@ -419,7 +419,7 @@
           <a:p>
             <a:fld id="{2D9AFD49-2911-40A0-8C34-1C3909DA5CA6}" type="datetimeFigureOut">
               <a:rPr lang="en-US" smtClean="0"/>
-              <a:t>6/5/2020</a:t>
+              <a:t>6/6/2020</a:t>
             </a:fld>
             <a:endParaRPr lang="en-US"/>
           </a:p>
@@ -599,7 +599,7 @@
           <a:p>
             <a:fld id="{2D9AFD49-2911-40A0-8C34-1C3909DA5CA6}" type="datetimeFigureOut">
               <a:rPr lang="en-US" smtClean="0"/>
-              <a:t>6/5/2020</a:t>
+              <a:t>6/6/2020</a:t>
             </a:fld>
             <a:endParaRPr lang="en-US"/>
           </a:p>
@@ -769,7 +769,7 @@
           <a:p>
             <a:fld id="{2D9AFD49-2911-40A0-8C34-1C3909DA5CA6}" type="datetimeFigureOut">
               <a:rPr lang="en-US" smtClean="0"/>
-              <a:t>6/5/2020</a:t>
+              <a:t>6/6/2020</a:t>
             </a:fld>
             <a:endParaRPr lang="en-US"/>
           </a:p>
@@ -1015,7 +1015,7 @@
           <a:p>
             <a:fld id="{2D9AFD49-2911-40A0-8C34-1C3909DA5CA6}" type="datetimeFigureOut">
               <a:rPr lang="en-US" smtClean="0"/>
-              <a:t>6/5/2020</a:t>
+              <a:t>6/6/2020</a:t>
             </a:fld>
             <a:endParaRPr lang="en-US"/>
           </a:p>
@@ -1247,7 +1247,7 @@
           <a:p>
             <a:fld id="{2D9AFD49-2911-40A0-8C34-1C3909DA5CA6}" type="datetimeFigureOut">
               <a:rPr lang="en-US" smtClean="0"/>
-              <a:t>6/5/2020</a:t>
+              <a:t>6/6/2020</a:t>
             </a:fld>
             <a:endParaRPr lang="en-US"/>
           </a:p>
@@ -1614,7 +1614,7 @@
           <a:p>
             <a:fld id="{2D9AFD49-2911-40A0-8C34-1C3909DA5CA6}" type="datetimeFigureOut">
               <a:rPr lang="en-US" smtClean="0"/>
-              <a:t>6/5/2020</a:t>
+              <a:t>6/6/2020</a:t>
             </a:fld>
             <a:endParaRPr lang="en-US"/>
           </a:p>
@@ -1732,7 +1732,7 @@
           <a:p>
             <a:fld id="{2D9AFD49-2911-40A0-8C34-1C3909DA5CA6}" type="datetimeFigureOut">
               <a:rPr lang="en-US" smtClean="0"/>
-              <a:t>6/5/2020</a:t>
+              <a:t>6/6/2020</a:t>
             </a:fld>
             <a:endParaRPr lang="en-US"/>
           </a:p>
@@ -1827,7 +1827,7 @@
           <a:p>
             <a:fld id="{2D9AFD49-2911-40A0-8C34-1C3909DA5CA6}" type="datetimeFigureOut">
               <a:rPr lang="en-US" smtClean="0"/>
-              <a:t>6/5/2020</a:t>
+              <a:t>6/6/2020</a:t>
             </a:fld>
             <a:endParaRPr lang="en-US"/>
           </a:p>
@@ -2104,7 +2104,7 @@
           <a:p>
             <a:fld id="{2D9AFD49-2911-40A0-8C34-1C3909DA5CA6}" type="datetimeFigureOut">
               <a:rPr lang="en-US" smtClean="0"/>
-              <a:t>6/5/2020</a:t>
+              <a:t>6/6/2020</a:t>
             </a:fld>
             <a:endParaRPr lang="en-US"/>
           </a:p>
@@ -2361,7 +2361,7 @@
           <a:p>
             <a:fld id="{2D9AFD49-2911-40A0-8C34-1C3909DA5CA6}" type="datetimeFigureOut">
               <a:rPr lang="en-US" smtClean="0"/>
-              <a:t>6/5/2020</a:t>
+              <a:t>6/6/2020</a:t>
             </a:fld>
             <a:endParaRPr lang="en-US"/>
           </a:p>
@@ -2574,7 +2574,7 @@
           <a:p>
             <a:fld id="{2D9AFD49-2911-40A0-8C34-1C3909DA5CA6}" type="datetimeFigureOut">
               <a:rPr lang="en-US" smtClean="0"/>
-              <a:t>6/5/2020</a:t>
+              <a:t>6/6/2020</a:t>
             </a:fld>
             <a:endParaRPr lang="en-US"/>
           </a:p>
@@ -3131,6 +3131,110 @@
           </a:p>
         </p:txBody>
       </p:sp>
+      <p:sp>
+        <p:nvSpPr>
+          <p:cNvPr id="2" name="Rectangle 1">
+            <a:extLst>
+              <a:ext uri="{FF2B5EF4-FFF2-40B4-BE49-F238E27FC236}">
+                <a16:creationId xmlns:a16="http://schemas.microsoft.com/office/drawing/2014/main" id="{C89AB944-6185-4733-B7EA-22B8F98DE25D}"/>
+              </a:ext>
+            </a:extLst>
+          </p:cNvPr>
+          <p:cNvSpPr/>
+          <p:nvPr/>
+        </p:nvSpPr>
+        <p:spPr>
+          <a:xfrm>
+            <a:off x="-2" y="0"/>
+            <a:ext cx="269083" cy="1096963"/>
+          </a:xfrm>
+          <a:prstGeom prst="rect">
+            <a:avLst/>
+          </a:prstGeom>
+          <a:solidFill>
+            <a:schemeClr val="bg1"/>
+          </a:solidFill>
+          <a:ln>
+            <a:noFill/>
+          </a:ln>
+        </p:spPr>
+        <p:style>
+          <a:lnRef idx="2">
+            <a:schemeClr val="accent1">
+              <a:shade val="50000"/>
+            </a:schemeClr>
+          </a:lnRef>
+          <a:fillRef idx="1">
+            <a:schemeClr val="accent1"/>
+          </a:fillRef>
+          <a:effectRef idx="0">
+            <a:schemeClr val="accent1"/>
+          </a:effectRef>
+          <a:fontRef idx="minor">
+            <a:schemeClr val="lt1"/>
+          </a:fontRef>
+        </p:style>
+        <p:txBody>
+          <a:bodyPr rtlCol="0" anchor="ctr"/>
+          <a:lstStyle/>
+          <a:p>
+            <a:pPr algn="ctr"/>
+            <a:endParaRPr lang="en-US"/>
+          </a:p>
+        </p:txBody>
+      </p:sp>
+      <p:sp>
+        <p:nvSpPr>
+          <p:cNvPr id="10" name="Rectangle 9">
+            <a:extLst>
+              <a:ext uri="{FF2B5EF4-FFF2-40B4-BE49-F238E27FC236}">
+                <a16:creationId xmlns:a16="http://schemas.microsoft.com/office/drawing/2014/main" id="{79398BE3-C054-4457-A6D6-E5BCE9904CFF}"/>
+              </a:ext>
+            </a:extLst>
+          </p:cNvPr>
+          <p:cNvSpPr/>
+          <p:nvPr/>
+        </p:nvSpPr>
+        <p:spPr>
+          <a:xfrm>
+            <a:off x="5293519" y="-1"/>
+            <a:ext cx="269083" cy="1096963"/>
+          </a:xfrm>
+          <a:prstGeom prst="rect">
+            <a:avLst/>
+          </a:prstGeom>
+          <a:solidFill>
+            <a:schemeClr val="bg1"/>
+          </a:solidFill>
+          <a:ln>
+            <a:noFill/>
+          </a:ln>
+        </p:spPr>
+        <p:style>
+          <a:lnRef idx="2">
+            <a:schemeClr val="accent1">
+              <a:shade val="50000"/>
+            </a:schemeClr>
+          </a:lnRef>
+          <a:fillRef idx="1">
+            <a:schemeClr val="accent1"/>
+          </a:fillRef>
+          <a:effectRef idx="0">
+            <a:schemeClr val="accent1"/>
+          </a:effectRef>
+          <a:fontRef idx="minor">
+            <a:schemeClr val="lt1"/>
+          </a:fontRef>
+        </p:style>
+        <p:txBody>
+          <a:bodyPr rtlCol="0" anchor="ctr"/>
+          <a:lstStyle/>
+          <a:p>
+            <a:pPr algn="ctr"/>
+            <a:endParaRPr lang="en-US"/>
+          </a:p>
+        </p:txBody>
+      </p:sp>
     </p:spTree>
     <p:extLst>
       <p:ext uri="{BB962C8B-B14F-4D97-AF65-F5344CB8AC3E}">
@@ -3313,6 +3417,110 @@
           </a:p>
         </p:txBody>
       </p:sp>
+      <p:sp>
+        <p:nvSpPr>
+          <p:cNvPr id="10" name="Rectangle 9">
+            <a:extLst>
+              <a:ext uri="{FF2B5EF4-FFF2-40B4-BE49-F238E27FC236}">
+                <a16:creationId xmlns:a16="http://schemas.microsoft.com/office/drawing/2014/main" id="{5FBF5D2C-59CF-4C1E-A71D-5AE64FEF163C}"/>
+              </a:ext>
+            </a:extLst>
+          </p:cNvPr>
+          <p:cNvSpPr/>
+          <p:nvPr/>
+        </p:nvSpPr>
+        <p:spPr>
+          <a:xfrm>
+            <a:off x="-2" y="0"/>
+            <a:ext cx="269083" cy="1096963"/>
+          </a:xfrm>
+          <a:prstGeom prst="rect">
+            <a:avLst/>
+          </a:prstGeom>
+          <a:solidFill>
+            <a:schemeClr val="bg1"/>
+          </a:solidFill>
+          <a:ln>
+            <a:noFill/>
+          </a:ln>
+        </p:spPr>
+        <p:style>
+          <a:lnRef idx="2">
+            <a:schemeClr val="accent1">
+              <a:shade val="50000"/>
+            </a:schemeClr>
+          </a:lnRef>
+          <a:fillRef idx="1">
+            <a:schemeClr val="accent1"/>
+          </a:fillRef>
+          <a:effectRef idx="0">
+            <a:schemeClr val="accent1"/>
+          </a:effectRef>
+          <a:fontRef idx="minor">
+            <a:schemeClr val="lt1"/>
+          </a:fontRef>
+        </p:style>
+        <p:txBody>
+          <a:bodyPr rtlCol="0" anchor="ctr"/>
+          <a:lstStyle/>
+          <a:p>
+            <a:pPr algn="ctr"/>
+            <a:endParaRPr lang="en-US"/>
+          </a:p>
+        </p:txBody>
+      </p:sp>
+      <p:sp>
+        <p:nvSpPr>
+          <p:cNvPr id="11" name="Rectangle 10">
+            <a:extLst>
+              <a:ext uri="{FF2B5EF4-FFF2-40B4-BE49-F238E27FC236}">
+                <a16:creationId xmlns:a16="http://schemas.microsoft.com/office/drawing/2014/main" id="{9A286599-C6C8-4965-A44C-444E3DE7E5F8}"/>
+              </a:ext>
+            </a:extLst>
+          </p:cNvPr>
+          <p:cNvSpPr/>
+          <p:nvPr/>
+        </p:nvSpPr>
+        <p:spPr>
+          <a:xfrm>
+            <a:off x="5293519" y="-1"/>
+            <a:ext cx="269083" cy="1096963"/>
+          </a:xfrm>
+          <a:prstGeom prst="rect">
+            <a:avLst/>
+          </a:prstGeom>
+          <a:solidFill>
+            <a:schemeClr val="bg1"/>
+          </a:solidFill>
+          <a:ln>
+            <a:noFill/>
+          </a:ln>
+        </p:spPr>
+        <p:style>
+          <a:lnRef idx="2">
+            <a:schemeClr val="accent1">
+              <a:shade val="50000"/>
+            </a:schemeClr>
+          </a:lnRef>
+          <a:fillRef idx="1">
+            <a:schemeClr val="accent1"/>
+          </a:fillRef>
+          <a:effectRef idx="0">
+            <a:schemeClr val="accent1"/>
+          </a:effectRef>
+          <a:fontRef idx="minor">
+            <a:schemeClr val="lt1"/>
+          </a:fontRef>
+        </p:style>
+        <p:txBody>
+          <a:bodyPr rtlCol="0" anchor="ctr"/>
+          <a:lstStyle/>
+          <a:p>
+            <a:pPr algn="ctr"/>
+            <a:endParaRPr lang="en-US"/>
+          </a:p>
+        </p:txBody>
+      </p:sp>
     </p:spTree>
     <p:extLst>
       <p:ext uri="{BB962C8B-B14F-4D97-AF65-F5344CB8AC3E}">
@@ -3495,6 +3703,110 @@
           </a:p>
         </p:txBody>
       </p:sp>
+      <p:sp>
+        <p:nvSpPr>
+          <p:cNvPr id="10" name="Rectangle 9">
+            <a:extLst>
+              <a:ext uri="{FF2B5EF4-FFF2-40B4-BE49-F238E27FC236}">
+                <a16:creationId xmlns:a16="http://schemas.microsoft.com/office/drawing/2014/main" id="{1B898E6B-454E-4120-B1AE-D78EAC5718C6}"/>
+              </a:ext>
+            </a:extLst>
+          </p:cNvPr>
+          <p:cNvSpPr/>
+          <p:nvPr/>
+        </p:nvSpPr>
+        <p:spPr>
+          <a:xfrm>
+            <a:off x="-2" y="0"/>
+            <a:ext cx="269083" cy="1096963"/>
+          </a:xfrm>
+          <a:prstGeom prst="rect">
+            <a:avLst/>
+          </a:prstGeom>
+          <a:solidFill>
+            <a:schemeClr val="bg1"/>
+          </a:solidFill>
+          <a:ln>
+            <a:noFill/>
+          </a:ln>
+        </p:spPr>
+        <p:style>
+          <a:lnRef idx="2">
+            <a:schemeClr val="accent1">
+              <a:shade val="50000"/>
+            </a:schemeClr>
+          </a:lnRef>
+          <a:fillRef idx="1">
+            <a:schemeClr val="accent1"/>
+          </a:fillRef>
+          <a:effectRef idx="0">
+            <a:schemeClr val="accent1"/>
+          </a:effectRef>
+          <a:fontRef idx="minor">
+            <a:schemeClr val="lt1"/>
+          </a:fontRef>
+        </p:style>
+        <p:txBody>
+          <a:bodyPr rtlCol="0" anchor="ctr"/>
+          <a:lstStyle/>
+          <a:p>
+            <a:pPr algn="ctr"/>
+            <a:endParaRPr lang="en-US"/>
+          </a:p>
+        </p:txBody>
+      </p:sp>
+      <p:sp>
+        <p:nvSpPr>
+          <p:cNvPr id="11" name="Rectangle 10">
+            <a:extLst>
+              <a:ext uri="{FF2B5EF4-FFF2-40B4-BE49-F238E27FC236}">
+                <a16:creationId xmlns:a16="http://schemas.microsoft.com/office/drawing/2014/main" id="{C51D1B04-24BB-4904-8D65-7310B90429F0}"/>
+              </a:ext>
+            </a:extLst>
+          </p:cNvPr>
+          <p:cNvSpPr/>
+          <p:nvPr/>
+        </p:nvSpPr>
+        <p:spPr>
+          <a:xfrm>
+            <a:off x="5293519" y="-1"/>
+            <a:ext cx="269083" cy="1096963"/>
+          </a:xfrm>
+          <a:prstGeom prst="rect">
+            <a:avLst/>
+          </a:prstGeom>
+          <a:solidFill>
+            <a:schemeClr val="bg1"/>
+          </a:solidFill>
+          <a:ln>
+            <a:noFill/>
+          </a:ln>
+        </p:spPr>
+        <p:style>
+          <a:lnRef idx="2">
+            <a:schemeClr val="accent1">
+              <a:shade val="50000"/>
+            </a:schemeClr>
+          </a:lnRef>
+          <a:fillRef idx="1">
+            <a:schemeClr val="accent1"/>
+          </a:fillRef>
+          <a:effectRef idx="0">
+            <a:schemeClr val="accent1"/>
+          </a:effectRef>
+          <a:fontRef idx="minor">
+            <a:schemeClr val="lt1"/>
+          </a:fontRef>
+        </p:style>
+        <p:txBody>
+          <a:bodyPr rtlCol="0" anchor="ctr"/>
+          <a:lstStyle/>
+          <a:p>
+            <a:pPr algn="ctr"/>
+            <a:endParaRPr lang="en-US"/>
+          </a:p>
+        </p:txBody>
+      </p:sp>
     </p:spTree>
     <p:extLst>
       <p:ext uri="{BB962C8B-B14F-4D97-AF65-F5344CB8AC3E}">
@@ -3677,6 +3989,110 @@
           </a:p>
         </p:txBody>
       </p:sp>
+      <p:sp>
+        <p:nvSpPr>
+          <p:cNvPr id="10" name="Rectangle 9">
+            <a:extLst>
+              <a:ext uri="{FF2B5EF4-FFF2-40B4-BE49-F238E27FC236}">
+                <a16:creationId xmlns:a16="http://schemas.microsoft.com/office/drawing/2014/main" id="{397B15B7-76A8-4446-82DB-AC8511FC4874}"/>
+              </a:ext>
+            </a:extLst>
+          </p:cNvPr>
+          <p:cNvSpPr/>
+          <p:nvPr/>
+        </p:nvSpPr>
+        <p:spPr>
+          <a:xfrm>
+            <a:off x="-2" y="0"/>
+            <a:ext cx="269083" cy="1096963"/>
+          </a:xfrm>
+          <a:prstGeom prst="rect">
+            <a:avLst/>
+          </a:prstGeom>
+          <a:solidFill>
+            <a:schemeClr val="bg1"/>
+          </a:solidFill>
+          <a:ln>
+            <a:noFill/>
+          </a:ln>
+        </p:spPr>
+        <p:style>
+          <a:lnRef idx="2">
+            <a:schemeClr val="accent1">
+              <a:shade val="50000"/>
+            </a:schemeClr>
+          </a:lnRef>
+          <a:fillRef idx="1">
+            <a:schemeClr val="accent1"/>
+          </a:fillRef>
+          <a:effectRef idx="0">
+            <a:schemeClr val="accent1"/>
+          </a:effectRef>
+          <a:fontRef idx="minor">
+            <a:schemeClr val="lt1"/>
+          </a:fontRef>
+        </p:style>
+        <p:txBody>
+          <a:bodyPr rtlCol="0" anchor="ctr"/>
+          <a:lstStyle/>
+          <a:p>
+            <a:pPr algn="ctr"/>
+            <a:endParaRPr lang="en-US"/>
+          </a:p>
+        </p:txBody>
+      </p:sp>
+      <p:sp>
+        <p:nvSpPr>
+          <p:cNvPr id="11" name="Rectangle 10">
+            <a:extLst>
+              <a:ext uri="{FF2B5EF4-FFF2-40B4-BE49-F238E27FC236}">
+                <a16:creationId xmlns:a16="http://schemas.microsoft.com/office/drawing/2014/main" id="{561928DA-87E5-464B-8E25-B1744C002D21}"/>
+              </a:ext>
+            </a:extLst>
+          </p:cNvPr>
+          <p:cNvSpPr/>
+          <p:nvPr/>
+        </p:nvSpPr>
+        <p:spPr>
+          <a:xfrm>
+            <a:off x="5293519" y="-1"/>
+            <a:ext cx="269083" cy="1096963"/>
+          </a:xfrm>
+          <a:prstGeom prst="rect">
+            <a:avLst/>
+          </a:prstGeom>
+          <a:solidFill>
+            <a:schemeClr val="bg1"/>
+          </a:solidFill>
+          <a:ln>
+            <a:noFill/>
+          </a:ln>
+        </p:spPr>
+        <p:style>
+          <a:lnRef idx="2">
+            <a:schemeClr val="accent1">
+              <a:shade val="50000"/>
+            </a:schemeClr>
+          </a:lnRef>
+          <a:fillRef idx="1">
+            <a:schemeClr val="accent1"/>
+          </a:fillRef>
+          <a:effectRef idx="0">
+            <a:schemeClr val="accent1"/>
+          </a:effectRef>
+          <a:fontRef idx="minor">
+            <a:schemeClr val="lt1"/>
+          </a:fontRef>
+        </p:style>
+        <p:txBody>
+          <a:bodyPr rtlCol="0" anchor="ctr"/>
+          <a:lstStyle/>
+          <a:p>
+            <a:pPr algn="ctr"/>
+            <a:endParaRPr lang="en-US"/>
+          </a:p>
+        </p:txBody>
+      </p:sp>
     </p:spTree>
     <p:extLst>
       <p:ext uri="{BB962C8B-B14F-4D97-AF65-F5344CB8AC3E}">
@@ -3859,6 +4275,110 @@
           </a:p>
         </p:txBody>
       </p:sp>
+      <p:sp>
+        <p:nvSpPr>
+          <p:cNvPr id="10" name="Rectangle 9">
+            <a:extLst>
+              <a:ext uri="{FF2B5EF4-FFF2-40B4-BE49-F238E27FC236}">
+                <a16:creationId xmlns:a16="http://schemas.microsoft.com/office/drawing/2014/main" id="{6209F9F6-E8E1-43A1-ABFD-ABC478853619}"/>
+              </a:ext>
+            </a:extLst>
+          </p:cNvPr>
+          <p:cNvSpPr/>
+          <p:nvPr/>
+        </p:nvSpPr>
+        <p:spPr>
+          <a:xfrm>
+            <a:off x="-2" y="0"/>
+            <a:ext cx="269083" cy="1096963"/>
+          </a:xfrm>
+          <a:prstGeom prst="rect">
+            <a:avLst/>
+          </a:prstGeom>
+          <a:solidFill>
+            <a:schemeClr val="bg1"/>
+          </a:solidFill>
+          <a:ln>
+            <a:noFill/>
+          </a:ln>
+        </p:spPr>
+        <p:style>
+          <a:lnRef idx="2">
+            <a:schemeClr val="accent1">
+              <a:shade val="50000"/>
+            </a:schemeClr>
+          </a:lnRef>
+          <a:fillRef idx="1">
+            <a:schemeClr val="accent1"/>
+          </a:fillRef>
+          <a:effectRef idx="0">
+            <a:schemeClr val="accent1"/>
+          </a:effectRef>
+          <a:fontRef idx="minor">
+            <a:schemeClr val="lt1"/>
+          </a:fontRef>
+        </p:style>
+        <p:txBody>
+          <a:bodyPr rtlCol="0" anchor="ctr"/>
+          <a:lstStyle/>
+          <a:p>
+            <a:pPr algn="ctr"/>
+            <a:endParaRPr lang="en-US"/>
+          </a:p>
+        </p:txBody>
+      </p:sp>
+      <p:sp>
+        <p:nvSpPr>
+          <p:cNvPr id="11" name="Rectangle 10">
+            <a:extLst>
+              <a:ext uri="{FF2B5EF4-FFF2-40B4-BE49-F238E27FC236}">
+                <a16:creationId xmlns:a16="http://schemas.microsoft.com/office/drawing/2014/main" id="{A1B08100-CE2F-4EE2-AB49-F7C6F524CB60}"/>
+              </a:ext>
+            </a:extLst>
+          </p:cNvPr>
+          <p:cNvSpPr/>
+          <p:nvPr/>
+        </p:nvSpPr>
+        <p:spPr>
+          <a:xfrm>
+            <a:off x="5293519" y="-1"/>
+            <a:ext cx="269083" cy="1096963"/>
+          </a:xfrm>
+          <a:prstGeom prst="rect">
+            <a:avLst/>
+          </a:prstGeom>
+          <a:solidFill>
+            <a:schemeClr val="bg1"/>
+          </a:solidFill>
+          <a:ln>
+            <a:noFill/>
+          </a:ln>
+        </p:spPr>
+        <p:style>
+          <a:lnRef idx="2">
+            <a:schemeClr val="accent1">
+              <a:shade val="50000"/>
+            </a:schemeClr>
+          </a:lnRef>
+          <a:fillRef idx="1">
+            <a:schemeClr val="accent1"/>
+          </a:fillRef>
+          <a:effectRef idx="0">
+            <a:schemeClr val="accent1"/>
+          </a:effectRef>
+          <a:fontRef idx="minor">
+            <a:schemeClr val="lt1"/>
+          </a:fontRef>
+        </p:style>
+        <p:txBody>
+          <a:bodyPr rtlCol="0" anchor="ctr"/>
+          <a:lstStyle/>
+          <a:p>
+            <a:pPr algn="ctr"/>
+            <a:endParaRPr lang="en-US"/>
+          </a:p>
+        </p:txBody>
+      </p:sp>
     </p:spTree>
     <p:extLst>
       <p:ext uri="{BB962C8B-B14F-4D97-AF65-F5344CB8AC3E}">
@@ -4041,6 +4561,110 @@
           </a:p>
         </p:txBody>
       </p:sp>
+      <p:sp>
+        <p:nvSpPr>
+          <p:cNvPr id="10" name="Rectangle 9">
+            <a:extLst>
+              <a:ext uri="{FF2B5EF4-FFF2-40B4-BE49-F238E27FC236}">
+                <a16:creationId xmlns:a16="http://schemas.microsoft.com/office/drawing/2014/main" id="{E27AD04B-6A09-4426-B971-B6F66FA34B6F}"/>
+              </a:ext>
+            </a:extLst>
+          </p:cNvPr>
+          <p:cNvSpPr/>
+          <p:nvPr/>
+        </p:nvSpPr>
+        <p:spPr>
+          <a:xfrm>
+            <a:off x="-2" y="0"/>
+            <a:ext cx="269083" cy="1096963"/>
+          </a:xfrm>
+          <a:prstGeom prst="rect">
+            <a:avLst/>
+          </a:prstGeom>
+          <a:solidFill>
+            <a:schemeClr val="bg1"/>
+          </a:solidFill>
+          <a:ln>
+            <a:noFill/>
+          </a:ln>
+        </p:spPr>
+        <p:style>
+          <a:lnRef idx="2">
+            <a:schemeClr val="accent1">
+              <a:shade val="50000"/>
+            </a:schemeClr>
+          </a:lnRef>
+          <a:fillRef idx="1">
+            <a:schemeClr val="accent1"/>
+          </a:fillRef>
+          <a:effectRef idx="0">
+            <a:schemeClr val="accent1"/>
+          </a:effectRef>
+          <a:fontRef idx="minor">
+            <a:schemeClr val="lt1"/>
+          </a:fontRef>
+        </p:style>
+        <p:txBody>
+          <a:bodyPr rtlCol="0" anchor="ctr"/>
+          <a:lstStyle/>
+          <a:p>
+            <a:pPr algn="ctr"/>
+            <a:endParaRPr lang="en-US"/>
+          </a:p>
+        </p:txBody>
+      </p:sp>
+      <p:sp>
+        <p:nvSpPr>
+          <p:cNvPr id="11" name="Rectangle 10">
+            <a:extLst>
+              <a:ext uri="{FF2B5EF4-FFF2-40B4-BE49-F238E27FC236}">
+                <a16:creationId xmlns:a16="http://schemas.microsoft.com/office/drawing/2014/main" id="{378DE5BB-2061-484F-ACBB-0D94EFCF1D57}"/>
+              </a:ext>
+            </a:extLst>
+          </p:cNvPr>
+          <p:cNvSpPr/>
+          <p:nvPr/>
+        </p:nvSpPr>
+        <p:spPr>
+          <a:xfrm>
+            <a:off x="5293519" y="-1"/>
+            <a:ext cx="269083" cy="1096963"/>
+          </a:xfrm>
+          <a:prstGeom prst="rect">
+            <a:avLst/>
+          </a:prstGeom>
+          <a:solidFill>
+            <a:schemeClr val="bg1"/>
+          </a:solidFill>
+          <a:ln>
+            <a:noFill/>
+          </a:ln>
+        </p:spPr>
+        <p:style>
+          <a:lnRef idx="2">
+            <a:schemeClr val="accent1">
+              <a:shade val="50000"/>
+            </a:schemeClr>
+          </a:lnRef>
+          <a:fillRef idx="1">
+            <a:schemeClr val="accent1"/>
+          </a:fillRef>
+          <a:effectRef idx="0">
+            <a:schemeClr val="accent1"/>
+          </a:effectRef>
+          <a:fontRef idx="minor">
+            <a:schemeClr val="lt1"/>
+          </a:fontRef>
+        </p:style>
+        <p:txBody>
+          <a:bodyPr rtlCol="0" anchor="ctr"/>
+          <a:lstStyle/>
+          <a:p>
+            <a:pPr algn="ctr"/>
+            <a:endParaRPr lang="en-US"/>
+          </a:p>
+        </p:txBody>
+      </p:sp>
     </p:spTree>
     <p:extLst>
       <p:ext uri="{BB962C8B-B14F-4D97-AF65-F5344CB8AC3E}">
@@ -4220,6 +4844,110 @@
               </a:rPr>
               <a:t>07</a:t>
             </a:r>
+          </a:p>
+        </p:txBody>
+      </p:sp>
+      <p:sp>
+        <p:nvSpPr>
+          <p:cNvPr id="10" name="Rectangle 9">
+            <a:extLst>
+              <a:ext uri="{FF2B5EF4-FFF2-40B4-BE49-F238E27FC236}">
+                <a16:creationId xmlns:a16="http://schemas.microsoft.com/office/drawing/2014/main" id="{36B5C25C-11F8-48A2-9EBF-EB31D57061B6}"/>
+              </a:ext>
+            </a:extLst>
+          </p:cNvPr>
+          <p:cNvSpPr/>
+          <p:nvPr/>
+        </p:nvSpPr>
+        <p:spPr>
+          <a:xfrm>
+            <a:off x="-2" y="0"/>
+            <a:ext cx="269083" cy="1096963"/>
+          </a:xfrm>
+          <a:prstGeom prst="rect">
+            <a:avLst/>
+          </a:prstGeom>
+          <a:solidFill>
+            <a:schemeClr val="bg1"/>
+          </a:solidFill>
+          <a:ln>
+            <a:noFill/>
+          </a:ln>
+        </p:spPr>
+        <p:style>
+          <a:lnRef idx="2">
+            <a:schemeClr val="accent1">
+              <a:shade val="50000"/>
+            </a:schemeClr>
+          </a:lnRef>
+          <a:fillRef idx="1">
+            <a:schemeClr val="accent1"/>
+          </a:fillRef>
+          <a:effectRef idx="0">
+            <a:schemeClr val="accent1"/>
+          </a:effectRef>
+          <a:fontRef idx="minor">
+            <a:schemeClr val="lt1"/>
+          </a:fontRef>
+        </p:style>
+        <p:txBody>
+          <a:bodyPr rtlCol="0" anchor="ctr"/>
+          <a:lstStyle/>
+          <a:p>
+            <a:pPr algn="ctr"/>
+            <a:endParaRPr lang="en-US"/>
+          </a:p>
+        </p:txBody>
+      </p:sp>
+      <p:sp>
+        <p:nvSpPr>
+          <p:cNvPr id="11" name="Rectangle 10">
+            <a:extLst>
+              <a:ext uri="{FF2B5EF4-FFF2-40B4-BE49-F238E27FC236}">
+                <a16:creationId xmlns:a16="http://schemas.microsoft.com/office/drawing/2014/main" id="{901B6005-C546-4140-BDFD-DBA8BF6CF22B}"/>
+              </a:ext>
+            </a:extLst>
+          </p:cNvPr>
+          <p:cNvSpPr/>
+          <p:nvPr/>
+        </p:nvSpPr>
+        <p:spPr>
+          <a:xfrm>
+            <a:off x="5293519" y="-1"/>
+            <a:ext cx="269083" cy="1096963"/>
+          </a:xfrm>
+          <a:prstGeom prst="rect">
+            <a:avLst/>
+          </a:prstGeom>
+          <a:solidFill>
+            <a:schemeClr val="bg1"/>
+          </a:solidFill>
+          <a:ln>
+            <a:noFill/>
+          </a:ln>
+        </p:spPr>
+        <p:style>
+          <a:lnRef idx="2">
+            <a:schemeClr val="accent1">
+              <a:shade val="50000"/>
+            </a:schemeClr>
+          </a:lnRef>
+          <a:fillRef idx="1">
+            <a:schemeClr val="accent1"/>
+          </a:fillRef>
+          <a:effectRef idx="0">
+            <a:schemeClr val="accent1"/>
+          </a:effectRef>
+          <a:fontRef idx="minor">
+            <a:schemeClr val="lt1"/>
+          </a:fontRef>
+        </p:style>
+        <p:txBody>
+          <a:bodyPr rtlCol="0" anchor="ctr"/>
+          <a:lstStyle/>
+          <a:p>
+            <a:pPr algn="ctr"/>
+            <a:endParaRPr lang="en-US"/>
           </a:p>
         </p:txBody>
       </p:sp>

</xml_diff>